<commit_message>
Redoing chap04 fig: PLE. To be continued (caption, text, and picture ameliorations)
</commit_message>
<xml_diff>
--- a/04-CrMagOpt/Pictures/PLEDotPres.pptx
+++ b/04-CrMagOpt/Pictures/PLEDotPres.pptx
@@ -7,7 +7,7 @@
   <p:sldIdLst>
     <p:sldId id="256" r:id="rId2"/>
   </p:sldIdLst>
-  <p:sldSz cx="9180513" cy="8640763"/>
+  <p:sldSz cx="11161713" cy="6948488"/>
   <p:notesSz cx="6858000" cy="9144000"/>
   <p:defaultTextStyle>
     <a:defPPr>
@@ -136,8 +136,8 @@
         </p:nvSpPr>
         <p:spPr>
           <a:xfrm>
-            <a:off x="688541" y="2684238"/>
-            <a:ext cx="7803437" cy="1852164"/>
+            <a:off x="837132" y="2158536"/>
+            <a:ext cx="9487458" cy="1489422"/>
           </a:xfrm>
         </p:spPr>
         <p:txBody>
@@ -164,8 +164,8 @@
         </p:nvSpPr>
         <p:spPr>
           <a:xfrm>
-            <a:off x="1377079" y="4896434"/>
-            <a:ext cx="6426360" cy="2208195"/>
+            <a:off x="1674267" y="3937484"/>
+            <a:ext cx="7813199" cy="1775725"/>
           </a:xfrm>
         </p:spPr>
         <p:txBody>
@@ -288,7 +288,7 @@
           <a:p>
             <a:fld id="{8DBBD053-8B74-4774-9EDF-619207C4621F}" type="datetimeFigureOut">
               <a:rPr lang="fr-FR" smtClean="0"/>
-              <a:t>06/04/2017</a:t>
+              <a:t>08/05/2017</a:t>
             </a:fld>
             <a:endParaRPr lang="fr-FR"/>
           </a:p>
@@ -458,7 +458,7 @@
           <a:p>
             <a:fld id="{8DBBD053-8B74-4774-9EDF-619207C4621F}" type="datetimeFigureOut">
               <a:rPr lang="fr-FR" smtClean="0"/>
-              <a:t>06/04/2017</a:t>
+              <a:t>08/05/2017</a:t>
             </a:fld>
             <a:endParaRPr lang="fr-FR"/>
           </a:p>
@@ -548,8 +548,8 @@
         </p:nvSpPr>
         <p:spPr>
           <a:xfrm>
-            <a:off x="5634226" y="326032"/>
-            <a:ext cx="1748441" cy="6966615"/>
+            <a:off x="6850128" y="262184"/>
+            <a:ext cx="2125764" cy="5602219"/>
           </a:xfrm>
         </p:spPr>
         <p:txBody>
@@ -576,8 +576,8 @@
         </p:nvSpPr>
         <p:spPr>
           <a:xfrm>
-            <a:off x="388897" y="326032"/>
-            <a:ext cx="5092316" cy="6966615"/>
+            <a:off x="472826" y="262184"/>
+            <a:ext cx="6191264" cy="5602219"/>
           </a:xfrm>
         </p:spPr>
         <p:txBody>
@@ -638,7 +638,7 @@
           <a:p>
             <a:fld id="{8DBBD053-8B74-4774-9EDF-619207C4621F}" type="datetimeFigureOut">
               <a:rPr lang="fr-FR" smtClean="0"/>
-              <a:t>06/04/2017</a:t>
+              <a:t>08/05/2017</a:t>
             </a:fld>
             <a:endParaRPr lang="fr-FR"/>
           </a:p>
@@ -808,7 +808,7 @@
           <a:p>
             <a:fld id="{8DBBD053-8B74-4774-9EDF-619207C4621F}" type="datetimeFigureOut">
               <a:rPr lang="fr-FR" smtClean="0"/>
-              <a:t>06/04/2017</a:t>
+              <a:t>08/05/2017</a:t>
             </a:fld>
             <a:endParaRPr lang="fr-FR"/>
           </a:p>
@@ -898,8 +898,8 @@
         </p:nvSpPr>
         <p:spPr>
           <a:xfrm>
-            <a:off x="725202" y="5552493"/>
-            <a:ext cx="7803437" cy="1716152"/>
+            <a:off x="881705" y="4465053"/>
+            <a:ext cx="9487458" cy="1380047"/>
           </a:xfrm>
         </p:spPr>
         <p:txBody>
@@ -930,8 +930,8 @@
         </p:nvSpPr>
         <p:spPr>
           <a:xfrm>
-            <a:off x="725202" y="3662324"/>
-            <a:ext cx="7803437" cy="1890167"/>
+            <a:off x="881705" y="2945070"/>
+            <a:ext cx="9487458" cy="1519981"/>
           </a:xfrm>
         </p:spPr>
         <p:txBody>
@@ -1054,7 +1054,7 @@
           <a:p>
             <a:fld id="{8DBBD053-8B74-4774-9EDF-619207C4621F}" type="datetimeFigureOut">
               <a:rPr lang="fr-FR" smtClean="0"/>
-              <a:t>06/04/2017</a:t>
+              <a:t>08/05/2017</a:t>
             </a:fld>
             <a:endParaRPr lang="fr-FR"/>
           </a:p>
@@ -1167,8 +1167,8 @@
         </p:nvSpPr>
         <p:spPr>
           <a:xfrm>
-            <a:off x="388897" y="1904172"/>
-            <a:ext cx="3420380" cy="5388475"/>
+            <a:off x="472830" y="1531246"/>
+            <a:ext cx="4158514" cy="4333154"/>
           </a:xfrm>
         </p:spPr>
         <p:txBody>
@@ -1252,8 +1252,8 @@
         </p:nvSpPr>
         <p:spPr>
           <a:xfrm>
-            <a:off x="3962284" y="1904172"/>
-            <a:ext cx="3420380" cy="5388475"/>
+            <a:off x="4817366" y="1531246"/>
+            <a:ext cx="4158514" cy="4333154"/>
           </a:xfrm>
         </p:spPr>
         <p:txBody>
@@ -1342,7 +1342,7 @@
           <a:p>
             <a:fld id="{8DBBD053-8B74-4774-9EDF-619207C4621F}" type="datetimeFigureOut">
               <a:rPr lang="fr-FR" smtClean="0"/>
-              <a:t>06/04/2017</a:t>
+              <a:t>08/05/2017</a:t>
             </a:fld>
             <a:endParaRPr lang="fr-FR"/>
           </a:p>
@@ -1432,8 +1432,8 @@
         </p:nvSpPr>
         <p:spPr>
           <a:xfrm>
-            <a:off x="459028" y="346035"/>
-            <a:ext cx="8262462" cy="1440127"/>
+            <a:off x="558091" y="278272"/>
+            <a:ext cx="10045542" cy="1158081"/>
           </a:xfrm>
         </p:spPr>
         <p:txBody>
@@ -1464,8 +1464,8 @@
         </p:nvSpPr>
         <p:spPr>
           <a:xfrm>
-            <a:off x="459030" y="1934172"/>
-            <a:ext cx="4056321" cy="806071"/>
+            <a:off x="558092" y="1555375"/>
+            <a:ext cx="4931695" cy="648203"/>
           </a:xfrm>
         </p:spPr>
         <p:txBody>
@@ -1529,8 +1529,8 @@
         </p:nvSpPr>
         <p:spPr>
           <a:xfrm>
-            <a:off x="459030" y="2740246"/>
-            <a:ext cx="4056321" cy="4978440"/>
+            <a:off x="558092" y="2203578"/>
+            <a:ext cx="4931695" cy="4003423"/>
           </a:xfrm>
         </p:spPr>
         <p:txBody>
@@ -1614,8 +1614,8 @@
         </p:nvSpPr>
         <p:spPr>
           <a:xfrm>
-            <a:off x="4663578" y="1934172"/>
-            <a:ext cx="4057914" cy="806071"/>
+            <a:off x="5670009" y="1555375"/>
+            <a:ext cx="4933632" cy="648203"/>
           </a:xfrm>
         </p:spPr>
         <p:txBody>
@@ -1679,8 +1679,8 @@
         </p:nvSpPr>
         <p:spPr>
           <a:xfrm>
-            <a:off x="4663578" y="2740246"/>
-            <a:ext cx="4057914" cy="4978440"/>
+            <a:off x="5670009" y="2203578"/>
+            <a:ext cx="4933632" cy="4003423"/>
           </a:xfrm>
         </p:spPr>
         <p:txBody>
@@ -1769,7 +1769,7 @@
           <a:p>
             <a:fld id="{8DBBD053-8B74-4774-9EDF-619207C4621F}" type="datetimeFigureOut">
               <a:rPr lang="fr-FR" smtClean="0"/>
-              <a:t>06/04/2017</a:t>
+              <a:t>08/05/2017</a:t>
             </a:fld>
             <a:endParaRPr lang="fr-FR"/>
           </a:p>
@@ -1887,7 +1887,7 @@
           <a:p>
             <a:fld id="{8DBBD053-8B74-4774-9EDF-619207C4621F}" type="datetimeFigureOut">
               <a:rPr lang="fr-FR" smtClean="0"/>
-              <a:t>06/04/2017</a:t>
+              <a:t>08/05/2017</a:t>
             </a:fld>
             <a:endParaRPr lang="fr-FR"/>
           </a:p>
@@ -1982,7 +1982,7 @@
           <a:p>
             <a:fld id="{8DBBD053-8B74-4774-9EDF-619207C4621F}" type="datetimeFigureOut">
               <a:rPr lang="fr-FR" smtClean="0"/>
-              <a:t>06/04/2017</a:t>
+              <a:t>08/05/2017</a:t>
             </a:fld>
             <a:endParaRPr lang="fr-FR"/>
           </a:p>
@@ -2072,8 +2072,8 @@
         </p:nvSpPr>
         <p:spPr>
           <a:xfrm>
-            <a:off x="459031" y="344032"/>
-            <a:ext cx="3020326" cy="1464130"/>
+            <a:off x="558092" y="276656"/>
+            <a:ext cx="3672127" cy="1177384"/>
           </a:xfrm>
         </p:spPr>
         <p:txBody>
@@ -2104,8 +2104,8 @@
         </p:nvSpPr>
         <p:spPr>
           <a:xfrm>
-            <a:off x="3589326" y="344032"/>
-            <a:ext cx="5132161" cy="7374652"/>
+            <a:off x="4363921" y="276661"/>
+            <a:ext cx="6239708" cy="5930341"/>
           </a:xfrm>
         </p:spPr>
         <p:txBody>
@@ -2189,8 +2189,8 @@
         </p:nvSpPr>
         <p:spPr>
           <a:xfrm>
-            <a:off x="459031" y="1808160"/>
-            <a:ext cx="3020326" cy="5910522"/>
+            <a:off x="558092" y="1454038"/>
+            <a:ext cx="3672127" cy="4752959"/>
           </a:xfrm>
         </p:spPr>
         <p:txBody>
@@ -2259,7 +2259,7 @@
           <a:p>
             <a:fld id="{8DBBD053-8B74-4774-9EDF-619207C4621F}" type="datetimeFigureOut">
               <a:rPr lang="fr-FR" smtClean="0"/>
-              <a:t>06/04/2017</a:t>
+              <a:t>08/05/2017</a:t>
             </a:fld>
             <a:endParaRPr lang="fr-FR"/>
           </a:p>
@@ -2349,8 +2349,8 @@
         </p:nvSpPr>
         <p:spPr>
           <a:xfrm>
-            <a:off x="1799446" y="6048534"/>
-            <a:ext cx="5508308" cy="714064"/>
+            <a:off x="2187783" y="4863943"/>
+            <a:ext cx="6697028" cy="574216"/>
           </a:xfrm>
         </p:spPr>
         <p:txBody>
@@ -2381,8 +2381,8 @@
         </p:nvSpPr>
         <p:spPr>
           <a:xfrm>
-            <a:off x="1799446" y="772072"/>
-            <a:ext cx="5508308" cy="5184458"/>
+            <a:off x="2187783" y="620869"/>
+            <a:ext cx="6697028" cy="4169093"/>
           </a:xfrm>
         </p:spPr>
         <p:txBody>
@@ -2442,8 +2442,8 @@
         </p:nvSpPr>
         <p:spPr>
           <a:xfrm>
-            <a:off x="1799446" y="6762600"/>
-            <a:ext cx="5508308" cy="1014089"/>
+            <a:off x="2187783" y="5438164"/>
+            <a:ext cx="6697028" cy="815483"/>
           </a:xfrm>
         </p:spPr>
         <p:txBody>
@@ -2512,7 +2512,7 @@
           <a:p>
             <a:fld id="{8DBBD053-8B74-4774-9EDF-619207C4621F}" type="datetimeFigureOut">
               <a:rPr lang="fr-FR" smtClean="0"/>
-              <a:t>06/04/2017</a:t>
+              <a:t>08/05/2017</a:t>
             </a:fld>
             <a:endParaRPr lang="fr-FR"/>
           </a:p>
@@ -2607,8 +2607,8 @@
         </p:nvSpPr>
         <p:spPr>
           <a:xfrm>
-            <a:off x="459028" y="346035"/>
-            <a:ext cx="8262462" cy="1440127"/>
+            <a:off x="558091" y="278272"/>
+            <a:ext cx="10045542" cy="1158081"/>
           </a:xfrm>
           <a:prstGeom prst="rect">
             <a:avLst/>
@@ -2640,8 +2640,8 @@
         </p:nvSpPr>
         <p:spPr>
           <a:xfrm>
-            <a:off x="459028" y="2016178"/>
-            <a:ext cx="8262462" cy="5702504"/>
+            <a:off x="558091" y="1621318"/>
+            <a:ext cx="10045542" cy="4585681"/>
           </a:xfrm>
           <a:prstGeom prst="rect">
             <a:avLst/>
@@ -2702,8 +2702,8 @@
         </p:nvSpPr>
         <p:spPr>
           <a:xfrm>
-            <a:off x="459026" y="8008709"/>
-            <a:ext cx="2142120" cy="460040"/>
+            <a:off x="558087" y="6440223"/>
+            <a:ext cx="2604401" cy="369942"/>
           </a:xfrm>
           <a:prstGeom prst="rect">
             <a:avLst/>
@@ -2725,7 +2725,7 @@
           <a:p>
             <a:fld id="{8DBBD053-8B74-4774-9EDF-619207C4621F}" type="datetimeFigureOut">
               <a:rPr lang="fr-FR" smtClean="0"/>
-              <a:t>06/04/2017</a:t>
+              <a:t>08/05/2017</a:t>
             </a:fld>
             <a:endParaRPr lang="fr-FR"/>
           </a:p>
@@ -2743,8 +2743,8 @@
         </p:nvSpPr>
         <p:spPr>
           <a:xfrm>
-            <a:off x="3136676" y="8008709"/>
-            <a:ext cx="2907162" cy="460040"/>
+            <a:off x="3813587" y="6440223"/>
+            <a:ext cx="3534541" cy="369942"/>
           </a:xfrm>
           <a:prstGeom prst="rect">
             <a:avLst/>
@@ -2780,8 +2780,8 @@
         </p:nvSpPr>
         <p:spPr>
           <a:xfrm>
-            <a:off x="6579368" y="8008709"/>
-            <a:ext cx="2142120" cy="460040"/>
+            <a:off x="7999228" y="6440223"/>
+            <a:ext cx="2604401" cy="369942"/>
           </a:xfrm>
           <a:prstGeom prst="rect">
             <a:avLst/>
@@ -3102,7 +3102,7 @@
       </p:grpSpPr>
       <p:pic>
         <p:nvPicPr>
-          <p:cNvPr id="10" name="Picture 2"/>
+          <p:cNvPr id="70" name="Picture 5"/>
           <p:cNvPicPr>
             <a:picLocks noChangeAspect="1" noChangeArrowheads="1"/>
           </p:cNvPicPr>
@@ -3123,8 +3123,8 @@
         </p:blipFill>
         <p:spPr bwMode="auto">
           <a:xfrm>
-            <a:off x="-88977" y="1517526"/>
-            <a:ext cx="4678363" cy="5422900"/>
+            <a:off x="7606800" y="-90000"/>
+            <a:ext cx="4111263" cy="6951600"/>
           </a:xfrm>
           <a:prstGeom prst="rect">
             <a:avLst/>
@@ -3166,7 +3166,7 @@
       </p:pic>
       <p:pic>
         <p:nvPicPr>
-          <p:cNvPr id="11" name="Picture 3"/>
+          <p:cNvPr id="71" name="Picture 2"/>
           <p:cNvPicPr>
             <a:picLocks noChangeAspect="1" noChangeArrowheads="1"/>
           </p:cNvPicPr>
@@ -3187,8 +3187,8 @@
         </p:blipFill>
         <p:spPr bwMode="auto">
           <a:xfrm>
-            <a:off x="4458047" y="-72107"/>
-            <a:ext cx="4884737" cy="8653463"/>
+            <a:off x="-88977" y="711375"/>
+            <a:ext cx="4678363" cy="5422900"/>
           </a:xfrm>
           <a:prstGeom prst="rect">
             <a:avLst/>
@@ -3230,13 +3230,13 @@
       </p:pic>
       <p:sp>
         <p:nvSpPr>
-          <p:cNvPr id="4" name="ZoneTexte 3"/>
+          <p:cNvPr id="72" name="ZoneTexte 71"/>
           <p:cNvSpPr txBox="1"/>
           <p:nvPr/>
         </p:nvSpPr>
         <p:spPr>
           <a:xfrm>
-            <a:off x="535758" y="1728093"/>
+            <a:off x="535758" y="921942"/>
             <a:ext cx="526106" cy="461665"/>
           </a:xfrm>
           <a:prstGeom prst="rect">
@@ -3264,16 +3264,137 @@
           </a:p>
         </p:txBody>
       </p:sp>
-      <p:sp>
-        <p:nvSpPr>
-          <p:cNvPr id="13" name="ZoneTexte 12"/>
+      <p:grpSp>
+        <p:nvGrpSpPr>
+          <p:cNvPr id="73" name="Groupe 72"/>
+          <p:cNvGrpSpPr/>
+          <p:nvPr/>
+        </p:nvGrpSpPr>
+        <p:grpSpPr>
+          <a:xfrm>
+            <a:off x="4356571" y="-90239"/>
+            <a:ext cx="4124325" cy="6970713"/>
+            <a:chOff x="4238625" y="0"/>
+            <a:chExt cx="4124325" cy="6970713"/>
+          </a:xfrm>
+        </p:grpSpPr>
+        <p:pic>
+          <p:nvPicPr>
+            <p:cNvPr id="74" name="Picture 4"/>
+            <p:cNvPicPr>
+              <a:picLocks noChangeAspect="1" noChangeArrowheads="1"/>
+            </p:cNvPicPr>
+            <p:nvPr/>
+          </p:nvPicPr>
+          <p:blipFill>
+            <a:blip r:embed="rId4">
+              <a:extLst>
+                <a:ext uri="{28A0092B-C50C-407E-A947-70E740481C1C}">
+                  <a14:useLocalDpi xmlns:a14="http://schemas.microsoft.com/office/drawing/2010/main" val="0"/>
+                </a:ext>
+              </a:extLst>
+            </a:blip>
+            <a:srcRect/>
+            <a:stretch>
+              <a:fillRect/>
+            </a:stretch>
+          </p:blipFill>
+          <p:spPr bwMode="auto">
+            <a:xfrm>
+              <a:off x="4238625" y="0"/>
+              <a:ext cx="4124325" cy="6970713"/>
+            </a:xfrm>
+            <a:prstGeom prst="rect">
+              <a:avLst/>
+            </a:prstGeom>
+            <a:noFill/>
+            <a:ln>
+              <a:noFill/>
+            </a:ln>
+            <a:effectLst/>
+            <a:extLst>
+              <a:ext uri="{909E8E84-426E-40DD-AFC4-6F175D3DCCD1}">
+                <a14:hiddenFill xmlns:a14="http://schemas.microsoft.com/office/drawing/2010/main">
+                  <a:solidFill>
+                    <a:schemeClr val="accent1"/>
+                  </a:solidFill>
+                </a14:hiddenFill>
+              </a:ext>
+              <a:ext uri="{91240B29-F687-4F45-9708-019B960494DF}">
+                <a14:hiddenLine xmlns:a14="http://schemas.microsoft.com/office/drawing/2010/main" w="9525">
+                  <a:solidFill>
+                    <a:schemeClr val="tx1"/>
+                  </a:solidFill>
+                  <a:miter lim="800000"/>
+                  <a:headEnd/>
+                  <a:tailEnd/>
+                </a14:hiddenLine>
+              </a:ext>
+              <a:ext uri="{AF507438-7753-43E0-B8FC-AC1667EBCBE1}">
+                <a14:hiddenEffects xmlns:a14="http://schemas.microsoft.com/office/drawing/2010/main">
+                  <a:effectLst>
+                    <a:outerShdw dist="35921" dir="2700000" algn="ctr" rotWithShape="0">
+                      <a:schemeClr val="bg2"/>
+                    </a:outerShdw>
+                  </a:effectLst>
+                </a14:hiddenEffects>
+              </a:ext>
+            </a:extLst>
+          </p:spPr>
+        </p:pic>
+        <p:sp>
+          <p:nvSpPr>
+            <p:cNvPr id="75" name="ZoneTexte 74"/>
+            <p:cNvSpPr txBox="1"/>
+            <p:nvPr/>
+          </p:nvSpPr>
+          <p:spPr>
+            <a:xfrm>
+              <a:off x="5108976" y="240184"/>
+              <a:ext cx="543739" cy="461665"/>
+            </a:xfrm>
+            <a:prstGeom prst="rect">
+              <a:avLst/>
+            </a:prstGeom>
+            <a:noFill/>
+          </p:spPr>
+          <p:txBody>
+            <a:bodyPr wrap="none" rtlCol="0">
+              <a:spAutoFit/>
+            </a:bodyPr>
+            <a:lstStyle/>
+            <a:p>
+              <a:r>
+                <a:rPr lang="fr-FR" sz="2400" dirty="0" smtClean="0">
+                  <a:solidFill>
+                    <a:schemeClr val="bg1"/>
+                  </a:solidFill>
+                  <a:latin typeface="Times New Roman" pitchFamily="18" charset="0"/>
+                  <a:cs typeface="Times New Roman" pitchFamily="18" charset="0"/>
+                </a:rPr>
+                <a:t>(b)</a:t>
+              </a:r>
+              <a:endParaRPr lang="fr-FR" sz="2400" dirty="0">
+                <a:solidFill>
+                  <a:schemeClr val="bg1"/>
+                </a:solidFill>
+                <a:latin typeface="Times New Roman" pitchFamily="18" charset="0"/>
+                <a:cs typeface="Times New Roman" pitchFamily="18" charset="0"/>
+              </a:endParaRPr>
+            </a:p>
+          </p:txBody>
+        </p:sp>
+      </p:grpSp>
+      <p:sp>
+        <p:nvSpPr>
+          <p:cNvPr id="76" name="ZoneTexte 75"/>
           <p:cNvSpPr txBox="1"/>
           <p:nvPr/>
         </p:nvSpPr>
         <p:spPr>
           <a:xfrm>
-            <a:off x="4622581" y="42292"/>
-            <a:ext cx="543739" cy="461665"/>
+            <a:off x="8461027" y="132259"/>
+            <a:ext cx="526106" cy="461665"/>
           </a:xfrm>
           <a:prstGeom prst="rect">
             <a:avLst/>
@@ -3288,12 +3409,18 @@
           <a:p>
             <a:r>
               <a:rPr lang="fr-FR" sz="2400" dirty="0" smtClean="0">
+                <a:solidFill>
+                  <a:schemeClr val="bg1"/>
+                </a:solidFill>
                 <a:latin typeface="Times New Roman" pitchFamily="18" charset="0"/>
                 <a:cs typeface="Times New Roman" pitchFamily="18" charset="0"/>
               </a:rPr>
-              <a:t>(b)</a:t>
+              <a:t>(c)</a:t>
             </a:r>
             <a:endParaRPr lang="fr-FR" sz="2400" dirty="0">
+              <a:solidFill>
+                <a:schemeClr val="bg1"/>
+              </a:solidFill>
               <a:latin typeface="Times New Roman" pitchFamily="18" charset="0"/>
               <a:cs typeface="Times New Roman" pitchFamily="18" charset="0"/>
             </a:endParaRPr>

</xml_diff>